<commit_message>
added presentacion, imagenes extra etc
</commit_message>
<xml_diff>
--- a/Entregables/Presentacion.pptx
+++ b/Entregables/Presentacion.pptx
@@ -13,9 +13,10 @@
     <p:sldId id="289" r:id="rId7"/>
     <p:sldId id="290" r:id="rId8"/>
     <p:sldId id="287" r:id="rId9"/>
-    <p:sldId id="283" r:id="rId10"/>
-    <p:sldId id="286" r:id="rId11"/>
-    <p:sldId id="285" r:id="rId12"/>
+    <p:sldId id="291" r:id="rId10"/>
+    <p:sldId id="283" r:id="rId11"/>
+    <p:sldId id="286" r:id="rId12"/>
+    <p:sldId id="285" r:id="rId13"/>
   </p:sldIdLst>
   <p:sldSz cx="12192000" cy="6858000"/>
   <p:notesSz cx="6858000" cy="9144000"/>
@@ -327,7 +328,7 @@
             <a:fld id="{5586B75A-687E-405C-8A0B-8D00578BA2C3}" type="datetimeFigureOut">
               <a:rPr lang="en-US" smtClean="0"/>
               <a:pPr/>
-              <a:t>7/1/2018</a:t>
+              <a:t>7/2/2018</a:t>
             </a:fld>
             <a:endParaRPr lang="en-US" dirty="0"/>
           </a:p>
@@ -518,7 +519,7 @@
           <a:p>
             <a:fld id="{5F4E5243-F52A-4D37-9694-EB26C6C31910}" type="datetimeFigureOut">
               <a:rPr lang="en-US" smtClean="0"/>
-              <a:t>7/1/2018</a:t>
+              <a:t>7/2/2018</a:t>
             </a:fld>
             <a:endParaRPr lang="en-US" dirty="0"/>
           </a:p>
@@ -698,7 +699,7 @@
           <a:p>
             <a:fld id="{3A77B6E1-634A-48DC-9E8B-D894023267EF}" type="datetimeFigureOut">
               <a:rPr lang="en-US" smtClean="0"/>
-              <a:t>7/1/2018</a:t>
+              <a:t>7/2/2018</a:t>
             </a:fld>
             <a:endParaRPr lang="en-US" dirty="0"/>
           </a:p>
@@ -868,7 +869,7 @@
           <a:p>
             <a:fld id="{7B2D3E9E-A95C-48F2-B4BF-A71542E0BE9A}" type="datetimeFigureOut">
               <a:rPr lang="en-US" smtClean="0"/>
-              <a:t>7/1/2018</a:t>
+              <a:t>7/2/2018</a:t>
             </a:fld>
             <a:endParaRPr lang="en-US" dirty="0"/>
           </a:p>
@@ -1125,7 +1126,7 @@
             <a:fld id="{5586B75A-687E-405C-8A0B-8D00578BA2C3}" type="datetimeFigureOut">
               <a:rPr lang="en-US" smtClean="0"/>
               <a:pPr/>
-              <a:t>7/1/2018</a:t>
+              <a:t>7/2/2018</a:t>
             </a:fld>
             <a:endParaRPr lang="en-US" dirty="0"/>
           </a:p>
@@ -1414,7 +1415,7 @@
           <a:p>
             <a:fld id="{F12952B5-7A2F-4CC8-B7CE-9234E21C2837}" type="datetimeFigureOut">
               <a:rPr lang="en-US" smtClean="0"/>
-              <a:t>7/1/2018</a:t>
+              <a:t>7/2/2018</a:t>
             </a:fld>
             <a:endParaRPr lang="en-US" dirty="0"/>
           </a:p>
@@ -1852,7 +1853,7 @@
           <a:p>
             <a:fld id="{CE1DA07A-9201-4B4B-BAF2-015AFA30F520}" type="datetimeFigureOut">
               <a:rPr lang="en-US" smtClean="0"/>
-              <a:t>7/1/2018</a:t>
+              <a:t>7/2/2018</a:t>
             </a:fld>
             <a:endParaRPr lang="en-US" dirty="0"/>
           </a:p>
@@ -1970,7 +1971,7 @@
           <a:p>
             <a:fld id="{73D7E00A-486F-4252-8B1D-E32645521F49}" type="datetimeFigureOut">
               <a:rPr lang="en-US" smtClean="0"/>
-              <a:t>7/1/2018</a:t>
+              <a:t>7/2/2018</a:t>
             </a:fld>
             <a:endParaRPr lang="en-US" dirty="0"/>
           </a:p>
@@ -2065,7 +2066,7 @@
           <a:p>
             <a:fld id="{8DDF5F92-E675-4B36-9A60-69A962A68675}" type="datetimeFigureOut">
               <a:rPr lang="en-US" smtClean="0"/>
-              <a:t>7/1/2018</a:t>
+              <a:t>7/2/2018</a:t>
             </a:fld>
             <a:endParaRPr lang="en-US" dirty="0"/>
           </a:p>
@@ -2421,7 +2422,7 @@
           <a:p>
             <a:fld id="{AF6E2C9B-5FA2-460D-9BE7-B0812FC2A6FF}" type="datetimeFigureOut">
               <a:rPr lang="en-US" smtClean="0"/>
-              <a:t>7/1/2018</a:t>
+              <a:t>7/2/2018</a:t>
             </a:fld>
             <a:endParaRPr lang="en-US" dirty="0"/>
           </a:p>
@@ -2739,7 +2740,7 @@
             <a:fld id="{5586B75A-687E-405C-8A0B-8D00578BA2C3}" type="datetimeFigureOut">
               <a:rPr lang="en-US" smtClean="0"/>
               <a:pPr/>
-              <a:t>7/1/2018</a:t>
+              <a:t>7/2/2018</a:t>
             </a:fld>
             <a:endParaRPr lang="en-US" dirty="0"/>
           </a:p>
@@ -2974,7 +2975,7 @@
             <a:fld id="{5586B75A-687E-405C-8A0B-8D00578BA2C3}" type="datetimeFigureOut">
               <a:rPr lang="en-US" smtClean="0"/>
               <a:pPr/>
-              <a:t>7/1/2018</a:t>
+              <a:t>7/2/2018</a:t>
             </a:fld>
             <a:endParaRPr lang="en-US" dirty="0"/>
           </a:p>
@@ -3531,44 +3532,12 @@
           </a:p>
         </p:txBody>
       </p:sp>
-      <p:pic>
-        <p:nvPicPr>
-          <p:cNvPr id="4" name="Imagen 3">
+      <p:grpSp>
+        <p:nvGrpSpPr>
+          <p:cNvPr id="3" name="Grupo 2">
             <a:extLst>
               <a:ext uri="{FF2B5EF4-FFF2-40B4-BE49-F238E27FC236}">
-                <a16:creationId xmlns:a16="http://schemas.microsoft.com/office/drawing/2014/main" id="{C2D425E0-CB7F-4E9A-A70B-435727E6CE6D}"/>
-              </a:ext>
-            </a:extLst>
-          </p:cNvPr>
-          <p:cNvPicPr>
-            <a:picLocks noChangeAspect="1"/>
-          </p:cNvPicPr>
-          <p:nvPr/>
-        </p:nvPicPr>
-        <p:blipFill>
-          <a:blip r:embed="rId2">
-            <a:biLevel thresh="75000"/>
-          </a:blip>
-          <a:stretch>
-            <a:fillRect/>
-          </a:stretch>
-        </p:blipFill>
-        <p:spPr>
-          <a:xfrm>
-            <a:off x="7516566" y="3607266"/>
-            <a:ext cx="2825900" cy="2919370"/>
-          </a:xfrm>
-          <a:prstGeom prst="rect">
-            <a:avLst/>
-          </a:prstGeom>
-        </p:spPr>
-      </p:pic>
-      <p:grpSp>
-        <p:nvGrpSpPr>
-          <p:cNvPr id="13" name="Grupo 12">
-            <a:extLst>
-              <a:ext uri="{FF2B5EF4-FFF2-40B4-BE49-F238E27FC236}">
-                <a16:creationId xmlns:a16="http://schemas.microsoft.com/office/drawing/2014/main" id="{2C02FC1C-AA76-4A33-A5F1-D7767F11DBEE}"/>
+                <a16:creationId xmlns:a16="http://schemas.microsoft.com/office/drawing/2014/main" id="{41BC9066-86BE-48F8-9164-B589444F7AAA}"/>
               </a:ext>
             </a:extLst>
           </p:cNvPr>
@@ -3577,102 +3546,155 @@
         </p:nvGrpSpPr>
         <p:grpSpPr>
           <a:xfrm>
-            <a:off x="10184235" y="4521667"/>
-            <a:ext cx="771789" cy="654341"/>
-            <a:chOff x="2340528" y="3858936"/>
-            <a:chExt cx="771789" cy="654341"/>
+            <a:off x="7516566" y="3607266"/>
+            <a:ext cx="3439458" cy="2919370"/>
+            <a:chOff x="7516566" y="3607266"/>
+            <a:chExt cx="3439458" cy="2919370"/>
           </a:xfrm>
         </p:grpSpPr>
-        <p:sp>
-          <p:nvSpPr>
-            <p:cNvPr id="6" name="Triángulo isósceles 5">
+        <p:pic>
+          <p:nvPicPr>
+            <p:cNvPr id="4" name="Imagen 3">
               <a:extLst>
                 <a:ext uri="{FF2B5EF4-FFF2-40B4-BE49-F238E27FC236}">
-                  <a16:creationId xmlns:a16="http://schemas.microsoft.com/office/drawing/2014/main" id="{6269E75D-4A1A-49B2-BD38-EBD6F1CCDBC6}"/>
+                  <a16:creationId xmlns:a16="http://schemas.microsoft.com/office/drawing/2014/main" id="{C2D425E0-CB7F-4E9A-A70B-435727E6CE6D}"/>
                 </a:ext>
               </a:extLst>
             </p:cNvPr>
-            <p:cNvSpPr/>
+            <p:cNvPicPr>
+              <a:picLocks noChangeAspect="1"/>
+            </p:cNvPicPr>
             <p:nvPr/>
-          </p:nvSpPr>
-          <p:spPr>
-            <a:xfrm rot="16200000">
-              <a:off x="2614437" y="3903809"/>
-              <a:ext cx="467252" cy="528508"/>
-            </a:xfrm>
-            <a:prstGeom prst="triangle">
-              <a:avLst/>
-            </a:prstGeom>
-            <a:ln w="76200"/>
-          </p:spPr>
-          <p:style>
-            <a:lnRef idx="2">
-              <a:schemeClr val="dk1"/>
-            </a:lnRef>
-            <a:fillRef idx="1">
-              <a:schemeClr val="lt1"/>
-            </a:fillRef>
-            <a:effectRef idx="0">
-              <a:schemeClr val="dk1"/>
-            </a:effectRef>
-            <a:fontRef idx="minor">
-              <a:schemeClr val="dk1"/>
-            </a:fontRef>
-          </p:style>
-          <p:txBody>
-            <a:bodyPr rtlCol="0" anchor="ctr"/>
-            <a:lstStyle/>
-            <a:p>
-              <a:pPr algn="ctr"/>
-              <a:endParaRPr lang="en-US"/>
-            </a:p>
-          </p:txBody>
-        </p:sp>
-        <p:sp>
-          <p:nvSpPr>
-            <p:cNvPr id="5" name="Rectángulo 4">
-              <a:extLst>
-                <a:ext uri="{FF2B5EF4-FFF2-40B4-BE49-F238E27FC236}">
-                  <a16:creationId xmlns:a16="http://schemas.microsoft.com/office/drawing/2014/main" id="{1818A42C-F407-4800-A429-92D1F95D9354}"/>
-                </a:ext>
-              </a:extLst>
-            </p:cNvPr>
-            <p:cNvSpPr/>
-            <p:nvPr/>
-          </p:nvSpPr>
+          </p:nvPicPr>
+          <p:blipFill>
+            <a:blip r:embed="rId2">
+              <a:biLevel thresh="75000"/>
+            </a:blip>
+            <a:stretch>
+              <a:fillRect/>
+            </a:stretch>
+          </p:blipFill>
           <p:spPr>
             <a:xfrm>
-              <a:off x="2340528" y="3858936"/>
-              <a:ext cx="486562" cy="654341"/>
+              <a:off x="7516566" y="3607266"/>
+              <a:ext cx="2825900" cy="2919370"/>
             </a:xfrm>
             <a:prstGeom prst="rect">
               <a:avLst/>
             </a:prstGeom>
-            <a:ln w="76200"/>
           </p:spPr>
-          <p:style>
-            <a:lnRef idx="2">
-              <a:schemeClr val="dk1"/>
-            </a:lnRef>
-            <a:fillRef idx="1">
-              <a:schemeClr val="lt1"/>
-            </a:fillRef>
-            <a:effectRef idx="0">
-              <a:schemeClr val="dk1"/>
-            </a:effectRef>
-            <a:fontRef idx="minor">
-              <a:schemeClr val="dk1"/>
-            </a:fontRef>
-          </p:style>
-          <p:txBody>
-            <a:bodyPr rtlCol="0" anchor="ctr"/>
-            <a:lstStyle/>
-            <a:p>
-              <a:pPr algn="ctr"/>
-              <a:endParaRPr lang="en-US"/>
-            </a:p>
-          </p:txBody>
-        </p:sp>
+        </p:pic>
+        <p:grpSp>
+          <p:nvGrpSpPr>
+            <p:cNvPr id="13" name="Grupo 12">
+              <a:extLst>
+                <a:ext uri="{FF2B5EF4-FFF2-40B4-BE49-F238E27FC236}">
+                  <a16:creationId xmlns:a16="http://schemas.microsoft.com/office/drawing/2014/main" id="{2C02FC1C-AA76-4A33-A5F1-D7767F11DBEE}"/>
+                </a:ext>
+              </a:extLst>
+            </p:cNvPr>
+            <p:cNvGrpSpPr/>
+            <p:nvPr/>
+          </p:nvGrpSpPr>
+          <p:grpSpPr>
+            <a:xfrm>
+              <a:off x="10184235" y="4521667"/>
+              <a:ext cx="771789" cy="654341"/>
+              <a:chOff x="2340528" y="3858936"/>
+              <a:chExt cx="771789" cy="654341"/>
+            </a:xfrm>
+          </p:grpSpPr>
+          <p:sp>
+            <p:nvSpPr>
+              <p:cNvPr id="6" name="Triángulo isósceles 5">
+                <a:extLst>
+                  <a:ext uri="{FF2B5EF4-FFF2-40B4-BE49-F238E27FC236}">
+                    <a16:creationId xmlns:a16="http://schemas.microsoft.com/office/drawing/2014/main" id="{6269E75D-4A1A-49B2-BD38-EBD6F1CCDBC6}"/>
+                  </a:ext>
+                </a:extLst>
+              </p:cNvPr>
+              <p:cNvSpPr/>
+              <p:nvPr/>
+            </p:nvSpPr>
+            <p:spPr>
+              <a:xfrm rot="16200000">
+                <a:off x="2614437" y="3903809"/>
+                <a:ext cx="467252" cy="528508"/>
+              </a:xfrm>
+              <a:prstGeom prst="triangle">
+                <a:avLst/>
+              </a:prstGeom>
+              <a:ln w="76200"/>
+            </p:spPr>
+            <p:style>
+              <a:lnRef idx="2">
+                <a:schemeClr val="dk1"/>
+              </a:lnRef>
+              <a:fillRef idx="1">
+                <a:schemeClr val="lt1"/>
+              </a:fillRef>
+              <a:effectRef idx="0">
+                <a:schemeClr val="dk1"/>
+              </a:effectRef>
+              <a:fontRef idx="minor">
+                <a:schemeClr val="dk1"/>
+              </a:fontRef>
+            </p:style>
+            <p:txBody>
+              <a:bodyPr rtlCol="0" anchor="ctr"/>
+              <a:lstStyle/>
+              <a:p>
+                <a:pPr algn="ctr"/>
+                <a:endParaRPr lang="en-US"/>
+              </a:p>
+            </p:txBody>
+          </p:sp>
+          <p:sp>
+            <p:nvSpPr>
+              <p:cNvPr id="5" name="Rectángulo 4">
+                <a:extLst>
+                  <a:ext uri="{FF2B5EF4-FFF2-40B4-BE49-F238E27FC236}">
+                    <a16:creationId xmlns:a16="http://schemas.microsoft.com/office/drawing/2014/main" id="{1818A42C-F407-4800-A429-92D1F95D9354}"/>
+                  </a:ext>
+                </a:extLst>
+              </p:cNvPr>
+              <p:cNvSpPr/>
+              <p:nvPr/>
+            </p:nvSpPr>
+            <p:spPr>
+              <a:xfrm>
+                <a:off x="2340528" y="3858936"/>
+                <a:ext cx="486562" cy="654341"/>
+              </a:xfrm>
+              <a:prstGeom prst="rect">
+                <a:avLst/>
+              </a:prstGeom>
+              <a:ln w="76200"/>
+            </p:spPr>
+            <p:style>
+              <a:lnRef idx="2">
+                <a:schemeClr val="dk1"/>
+              </a:lnRef>
+              <a:fillRef idx="1">
+                <a:schemeClr val="lt1"/>
+              </a:fillRef>
+              <a:effectRef idx="0">
+                <a:schemeClr val="dk1"/>
+              </a:effectRef>
+              <a:fontRef idx="minor">
+                <a:schemeClr val="dk1"/>
+              </a:fontRef>
+            </p:style>
+            <p:txBody>
+              <a:bodyPr rtlCol="0" anchor="ctr"/>
+              <a:lstStyle/>
+              <a:p>
+                <a:pPr algn="ctr"/>
+                <a:endParaRPr lang="en-US"/>
+              </a:p>
+            </p:txBody>
+          </p:sp>
+        </p:grpSp>
       </p:grpSp>
     </p:spTree>
     <p:extLst>
@@ -3743,7 +3765,7 @@
             </a:pPr>
             <a:r>
               <a:rPr lang="en-US" sz="3600" b="1" dirty="0"/>
-              <a:t>Results: Second user testing</a:t>
+              <a:t>Results: First user testing</a:t>
             </a:r>
           </a:p>
         </p:txBody>
@@ -3797,6 +3819,126 @@
     </p:spTree>
     <p:extLst>
       <p:ext uri="{BB962C8B-B14F-4D97-AF65-F5344CB8AC3E}">
+        <p14:creationId xmlns:p14="http://schemas.microsoft.com/office/powerpoint/2010/main" val="1247071809"/>
+      </p:ext>
+    </p:extLst>
+  </p:cSld>
+  <p:clrMapOvr>
+    <a:masterClrMapping/>
+  </p:clrMapOvr>
+</p:sld>
+</file>
+
+<file path=ppt/slides/slide11.xml><?xml version="1.0" encoding="utf-8"?>
+<p:sld xmlns:a="http://schemas.openxmlformats.org/drawingml/2006/main" xmlns:r="http://schemas.openxmlformats.org/officeDocument/2006/relationships" xmlns:p="http://schemas.openxmlformats.org/presentationml/2006/main" showMasterSp="0">
+  <p:cSld>
+    <p:bg>
+      <p:bgPr>
+        <a:solidFill>
+          <a:schemeClr val="accent1">
+            <a:lumMod val="50000"/>
+          </a:schemeClr>
+        </a:solidFill>
+        <a:effectLst/>
+      </p:bgPr>
+    </p:bg>
+    <p:spTree>
+      <p:nvGrpSpPr>
+        <p:cNvPr id="1" name=""/>
+        <p:cNvGrpSpPr/>
+        <p:nvPr/>
+      </p:nvGrpSpPr>
+      <p:grpSpPr>
+        <a:xfrm>
+          <a:off x="0" y="0"/>
+          <a:ext cx="0" cy="0"/>
+          <a:chOff x="0" y="0"/>
+          <a:chExt cx="0" cy="0"/>
+        </a:xfrm>
+      </p:grpSpPr>
+      <p:sp>
+        <p:nvSpPr>
+          <p:cNvPr id="3" name="Subtítulo 2"/>
+          <p:cNvSpPr>
+            <a:spLocks noGrp="1"/>
+          </p:cNvSpPr>
+          <p:nvPr>
+            <p:ph type="subTitle" idx="1"/>
+          </p:nvPr>
+        </p:nvSpPr>
+        <p:spPr>
+          <a:xfrm>
+            <a:off x="0" y="318249"/>
+            <a:ext cx="12192000" cy="850151"/>
+          </a:xfrm>
+        </p:spPr>
+        <p:txBody>
+          <a:bodyPr>
+            <a:noAutofit/>
+          </a:bodyPr>
+          <a:lstStyle/>
+          <a:p>
+            <a:pPr algn="ctr">
+              <a:lnSpc>
+                <a:spcPct val="150000"/>
+              </a:lnSpc>
+            </a:pPr>
+            <a:r>
+              <a:rPr lang="en-US" sz="3600" b="1" dirty="0"/>
+              <a:t>Results: Second user testing</a:t>
+            </a:r>
+          </a:p>
+        </p:txBody>
+      </p:sp>
+      <p:sp>
+        <p:nvSpPr>
+          <p:cNvPr id="9" name="Rectángulo 8"/>
+          <p:cNvSpPr/>
+          <p:nvPr/>
+        </p:nvSpPr>
+        <p:spPr>
+          <a:xfrm>
+            <a:off x="0" y="1270001"/>
+            <a:ext cx="12192000" cy="5588001"/>
+          </a:xfrm>
+          <a:prstGeom prst="rect">
+            <a:avLst/>
+          </a:prstGeom>
+          <a:solidFill>
+            <a:schemeClr val="bg1"/>
+          </a:solidFill>
+          <a:ln>
+            <a:noFill/>
+          </a:ln>
+        </p:spPr>
+        <p:style>
+          <a:lnRef idx="2">
+            <a:schemeClr val="accent1">
+              <a:shade val="50000"/>
+            </a:schemeClr>
+          </a:lnRef>
+          <a:fillRef idx="1">
+            <a:schemeClr val="accent1"/>
+          </a:fillRef>
+          <a:effectRef idx="0">
+            <a:schemeClr val="accent1"/>
+          </a:effectRef>
+          <a:fontRef idx="minor">
+            <a:schemeClr val="lt1"/>
+          </a:fontRef>
+        </p:style>
+        <p:txBody>
+          <a:bodyPr rtlCol="0" anchor="ctr"/>
+          <a:lstStyle/>
+          <a:p>
+            <a:pPr algn="ctr"/>
+            <a:endParaRPr lang="en-US" dirty="0"/>
+          </a:p>
+        </p:txBody>
+      </p:sp>
+    </p:spTree>
+    <p:extLst>
+      <p:ext uri="{BB962C8B-B14F-4D97-AF65-F5344CB8AC3E}">
         <p14:creationId xmlns:p14="http://schemas.microsoft.com/office/powerpoint/2010/main" val="139530594"/>
       </p:ext>
     </p:extLst>
@@ -3807,7 +3949,7 @@
 </p:sld>
 </file>
 
-<file path=ppt/slides/slide11.xml><?xml version="1.0" encoding="utf-8"?>
+<file path=ppt/slides/slide12.xml><?xml version="1.0" encoding="utf-8"?>
 <p:sld xmlns:a="http://schemas.openxmlformats.org/drawingml/2006/main" xmlns:r="http://schemas.openxmlformats.org/officeDocument/2006/relationships" xmlns:p="http://schemas.openxmlformats.org/presentationml/2006/main" showMasterSp="0">
   <p:cSld>
     <p:bg>
@@ -4823,7 +4965,7 @@
             </a:pPr>
             <a:r>
               <a:rPr lang="en-US" sz="3600" b="1" dirty="0"/>
-              <a:t>Results: First user testing</a:t>
+              <a:t>Results: Output stability</a:t>
             </a:r>
           </a:p>
         </p:txBody>
@@ -4877,7 +5019,7 @@
     </p:spTree>
     <p:extLst>
       <p:ext uri="{BB962C8B-B14F-4D97-AF65-F5344CB8AC3E}">
-        <p14:creationId xmlns:p14="http://schemas.microsoft.com/office/powerpoint/2010/main" val="1247071809"/>
+        <p14:creationId xmlns:p14="http://schemas.microsoft.com/office/powerpoint/2010/main" val="2263191293"/>
       </p:ext>
     </p:extLst>
   </p:cSld>

</xml_diff>